<commit_message>
Removed temp secrets and bin and debug
</commit_message>
<xml_diff>
--- a/Whiteboard design session/Solution Architecture.pptx
+++ b/Whiteboard design session/Solution Architecture.pptx
@@ -259,7 +259,7 @@
           <a:p>
             <a:fld id="{2C59FA32-7C2F-4251-80D1-D8168C42D6A9}" type="datetimeFigureOut">
               <a:rPr lang="en-US" smtClean="0"/>
-              <a:t>9/10/2019</a:t>
+              <a:t>7/1/2020</a:t>
             </a:fld>
             <a:endParaRPr lang="en-US"/>
           </a:p>
@@ -457,7 +457,7 @@
           <a:p>
             <a:fld id="{2C59FA32-7C2F-4251-80D1-D8168C42D6A9}" type="datetimeFigureOut">
               <a:rPr lang="en-US" smtClean="0"/>
-              <a:t>9/10/2019</a:t>
+              <a:t>7/1/2020</a:t>
             </a:fld>
             <a:endParaRPr lang="en-US"/>
           </a:p>
@@ -665,7 +665,7 @@
           <a:p>
             <a:fld id="{2C59FA32-7C2F-4251-80D1-D8168C42D6A9}" type="datetimeFigureOut">
               <a:rPr lang="en-US" smtClean="0"/>
-              <a:t>9/10/2019</a:t>
+              <a:t>7/1/2020</a:t>
             </a:fld>
             <a:endParaRPr lang="en-US"/>
           </a:p>
@@ -863,7 +863,7 @@
           <a:p>
             <a:fld id="{2C59FA32-7C2F-4251-80D1-D8168C42D6A9}" type="datetimeFigureOut">
               <a:rPr lang="en-US" smtClean="0"/>
-              <a:t>9/10/2019</a:t>
+              <a:t>7/1/2020</a:t>
             </a:fld>
             <a:endParaRPr lang="en-US"/>
           </a:p>
@@ -1138,7 +1138,7 @@
           <a:p>
             <a:fld id="{2C59FA32-7C2F-4251-80D1-D8168C42D6A9}" type="datetimeFigureOut">
               <a:rPr lang="en-US" smtClean="0"/>
-              <a:t>9/10/2019</a:t>
+              <a:t>7/1/2020</a:t>
             </a:fld>
             <a:endParaRPr lang="en-US"/>
           </a:p>
@@ -1403,7 +1403,7 @@
           <a:p>
             <a:fld id="{2C59FA32-7C2F-4251-80D1-D8168C42D6A9}" type="datetimeFigureOut">
               <a:rPr lang="en-US" smtClean="0"/>
-              <a:t>9/10/2019</a:t>
+              <a:t>7/1/2020</a:t>
             </a:fld>
             <a:endParaRPr lang="en-US"/>
           </a:p>
@@ -1815,7 +1815,7 @@
           <a:p>
             <a:fld id="{2C59FA32-7C2F-4251-80D1-D8168C42D6A9}" type="datetimeFigureOut">
               <a:rPr lang="en-US" smtClean="0"/>
-              <a:t>9/10/2019</a:t>
+              <a:t>7/1/2020</a:t>
             </a:fld>
             <a:endParaRPr lang="en-US"/>
           </a:p>
@@ -1956,7 +1956,7 @@
           <a:p>
             <a:fld id="{2C59FA32-7C2F-4251-80D1-D8168C42D6A9}" type="datetimeFigureOut">
               <a:rPr lang="en-US" smtClean="0"/>
-              <a:t>9/10/2019</a:t>
+              <a:t>7/1/2020</a:t>
             </a:fld>
             <a:endParaRPr lang="en-US"/>
           </a:p>
@@ -2069,7 +2069,7 @@
           <a:p>
             <a:fld id="{2C59FA32-7C2F-4251-80D1-D8168C42D6A9}" type="datetimeFigureOut">
               <a:rPr lang="en-US" smtClean="0"/>
-              <a:t>9/10/2019</a:t>
+              <a:t>7/1/2020</a:t>
             </a:fld>
             <a:endParaRPr lang="en-US"/>
           </a:p>
@@ -2380,7 +2380,7 @@
           <a:p>
             <a:fld id="{2C59FA32-7C2F-4251-80D1-D8168C42D6A9}" type="datetimeFigureOut">
               <a:rPr lang="en-US" smtClean="0"/>
-              <a:t>9/10/2019</a:t>
+              <a:t>7/1/2020</a:t>
             </a:fld>
             <a:endParaRPr lang="en-US"/>
           </a:p>
@@ -2668,7 +2668,7 @@
           <a:p>
             <a:fld id="{2C59FA32-7C2F-4251-80D1-D8168C42D6A9}" type="datetimeFigureOut">
               <a:rPr lang="en-US" smtClean="0"/>
-              <a:t>9/10/2019</a:t>
+              <a:t>7/1/2020</a:t>
             </a:fld>
             <a:endParaRPr lang="en-US"/>
           </a:p>
@@ -2909,7 +2909,7 @@
           <a:p>
             <a:fld id="{2C59FA32-7C2F-4251-80D1-D8168C42D6A9}" type="datetimeFigureOut">
               <a:rPr lang="en-US" smtClean="0"/>
-              <a:t>9/10/2019</a:t>
+              <a:t>7/1/2020</a:t>
             </a:fld>
             <a:endParaRPr lang="en-US"/>
           </a:p>
@@ -3328,10 +3328,10 @@
       </p:grpSpPr>
       <p:pic>
         <p:nvPicPr>
-          <p:cNvPr id="4" name="Picture 3">
-            <a:extLst>
-              <a:ext uri="{FF2B5EF4-FFF2-40B4-BE49-F238E27FC236}">
-                <a16:creationId xmlns:a16="http://schemas.microsoft.com/office/drawing/2014/main" id="{3A9BD127-81A9-4CAB-9981-1F4FA8EECA36}"/>
+          <p:cNvPr id="8" name="Picture 7">
+            <a:extLst>
+              <a:ext uri="{FF2B5EF4-FFF2-40B4-BE49-F238E27FC236}">
+                <a16:creationId xmlns:a16="http://schemas.microsoft.com/office/drawing/2014/main" id="{0D333717-17D5-4209-AFEB-3960230B32F2}"/>
               </a:ext>
             </a:extLst>
           </p:cNvPr>
@@ -3348,532 +3348,20 @@
               </a:ext>
             </a:extLst>
           </a:blip>
-          <a:srcRect/>
-          <a:stretch/>
+          <a:stretch>
+            <a:fillRect/>
+          </a:stretch>
         </p:blipFill>
         <p:spPr>
           <a:xfrm>
-            <a:off x="1071562" y="512642"/>
-            <a:ext cx="10048875" cy="5832716"/>
+            <a:off x="188359" y="0"/>
+            <a:ext cx="11815281" cy="6858000"/>
           </a:xfrm>
           <a:prstGeom prst="rect">
             <a:avLst/>
           </a:prstGeom>
         </p:spPr>
       </p:pic>
-      <p:grpSp>
-        <p:nvGrpSpPr>
-          <p:cNvPr id="18" name="Group 17">
-            <a:extLst>
-              <a:ext uri="{FF2B5EF4-FFF2-40B4-BE49-F238E27FC236}">
-                <a16:creationId xmlns:a16="http://schemas.microsoft.com/office/drawing/2014/main" id="{9BEF942B-1F0A-4C66-9FF5-F750102F0003}"/>
-              </a:ext>
-            </a:extLst>
-          </p:cNvPr>
-          <p:cNvGrpSpPr/>
-          <p:nvPr/>
-        </p:nvGrpSpPr>
-        <p:grpSpPr>
-          <a:xfrm>
-            <a:off x="6983733" y="2674620"/>
-            <a:ext cx="2655567" cy="1640205"/>
-            <a:chOff x="6983733" y="2674620"/>
-            <a:chExt cx="2655567" cy="1640205"/>
-          </a:xfrm>
-        </p:grpSpPr>
-        <p:pic>
-          <p:nvPicPr>
-            <p:cNvPr id="6" name="Graphic 5">
-              <a:extLst>
-                <a:ext uri="{FF2B5EF4-FFF2-40B4-BE49-F238E27FC236}">
-                  <a16:creationId xmlns:a16="http://schemas.microsoft.com/office/drawing/2014/main" id="{7A2FF006-7FFB-430D-B0D9-4EF9F9059389}"/>
-                </a:ext>
-              </a:extLst>
-            </p:cNvPr>
-            <p:cNvPicPr>
-              <a:picLocks noChangeAspect="1"/>
-            </p:cNvPicPr>
-            <p:nvPr/>
-          </p:nvPicPr>
-          <p:blipFill>
-            <a:blip r:embed="rId3">
-              <a:extLst>
-                <a:ext uri="{28A0092B-C50C-407E-A947-70E740481C1C}">
-                  <a14:useLocalDpi xmlns:a14="http://schemas.microsoft.com/office/drawing/2010/main" val="0"/>
-                </a:ext>
-                <a:ext uri="{96DAC541-7B7A-43D3-8B79-37D633B846F1}">
-                  <asvg:svgBlip xmlns:asvg="http://schemas.microsoft.com/office/drawing/2016/SVG/main" r:embed="rId4"/>
-                </a:ext>
-              </a:extLst>
-            </a:blip>
-            <a:stretch>
-              <a:fillRect/>
-            </a:stretch>
-          </p:blipFill>
-          <p:spPr>
-            <a:xfrm>
-              <a:off x="7158990" y="2674620"/>
-              <a:ext cx="731520" cy="731520"/>
-            </a:xfrm>
-            <a:prstGeom prst="rect">
-              <a:avLst/>
-            </a:prstGeom>
-          </p:spPr>
-        </p:pic>
-        <p:sp>
-          <p:nvSpPr>
-            <p:cNvPr id="7" name="TextBox 6">
-              <a:extLst>
-                <a:ext uri="{FF2B5EF4-FFF2-40B4-BE49-F238E27FC236}">
-                  <a16:creationId xmlns:a16="http://schemas.microsoft.com/office/drawing/2014/main" id="{87864A0E-0B4B-44BC-B1C0-60FA4D61D27A}"/>
-                </a:ext>
-              </a:extLst>
-            </p:cNvPr>
-            <p:cNvSpPr txBox="1"/>
-            <p:nvPr/>
-          </p:nvSpPr>
-          <p:spPr>
-            <a:xfrm>
-              <a:off x="7071361" y="3406140"/>
-              <a:ext cx="1034257" cy="761747"/>
-            </a:xfrm>
-            <a:prstGeom prst="rect">
-              <a:avLst/>
-            </a:prstGeom>
-            <a:noFill/>
-          </p:spPr>
-          <p:txBody>
-            <a:bodyPr wrap="none" rtlCol="0">
-              <a:spAutoFit/>
-            </a:bodyPr>
-            <a:lstStyle/>
-            <a:p>
-              <a:r>
-                <a:rPr lang="en-US" sz="1200" b="1" dirty="0"/>
-                <a:t>Logic App</a:t>
-              </a:r>
-              <a:endParaRPr lang="en-US" sz="1200" dirty="0"/>
-            </a:p>
-            <a:p>
-              <a:r>
-                <a:rPr lang="en-US" sz="1050" dirty="0"/>
-                <a:t>Triggered via</a:t>
-              </a:r>
-            </a:p>
-            <a:p>
-              <a:r>
-                <a:rPr lang="en-US" sz="1050" dirty="0"/>
-                <a:t>Service Bus</a:t>
-              </a:r>
-            </a:p>
-            <a:p>
-              <a:r>
-                <a:rPr lang="en-US" sz="1050" dirty="0"/>
-                <a:t>Message added</a:t>
-              </a:r>
-            </a:p>
-          </p:txBody>
-        </p:sp>
-        <p:cxnSp>
-          <p:nvCxnSpPr>
-            <p:cNvPr id="9" name="Connector: Elbow 8">
-              <a:extLst>
-                <a:ext uri="{FF2B5EF4-FFF2-40B4-BE49-F238E27FC236}">
-                  <a16:creationId xmlns:a16="http://schemas.microsoft.com/office/drawing/2014/main" id="{68248589-D356-4415-9F42-8322316AE755}"/>
-                </a:ext>
-              </a:extLst>
-            </p:cNvPr>
-            <p:cNvCxnSpPr>
-              <a:cxnSpLocks/>
-              <a:endCxn id="6" idx="1"/>
-            </p:cNvCxnSpPr>
-            <p:nvPr/>
-          </p:nvCxnSpPr>
-          <p:spPr>
-            <a:xfrm rot="5400000" flipH="1" flipV="1">
-              <a:off x="6434139" y="3589974"/>
-              <a:ext cx="1274445" cy="175258"/>
-            </a:xfrm>
-            <a:prstGeom prst="bentConnector2">
-              <a:avLst/>
-            </a:prstGeom>
-            <a:ln>
-              <a:tailEnd type="triangle"/>
-            </a:ln>
-          </p:spPr>
-          <p:style>
-            <a:lnRef idx="1">
-              <a:schemeClr val="accent1"/>
-            </a:lnRef>
-            <a:fillRef idx="0">
-              <a:schemeClr val="accent1"/>
-            </a:fillRef>
-            <a:effectRef idx="0">
-              <a:schemeClr val="accent1"/>
-            </a:effectRef>
-            <a:fontRef idx="minor">
-              <a:schemeClr val="tx1"/>
-            </a:fontRef>
-          </p:style>
-        </p:cxnSp>
-        <p:cxnSp>
-          <p:nvCxnSpPr>
-            <p:cNvPr id="12" name="Connector: Elbow 11">
-              <a:extLst>
-                <a:ext uri="{FF2B5EF4-FFF2-40B4-BE49-F238E27FC236}">
-                  <a16:creationId xmlns:a16="http://schemas.microsoft.com/office/drawing/2014/main" id="{F0D0D7B6-415E-446C-8378-8F80C453C0E7}"/>
-                </a:ext>
-              </a:extLst>
-            </p:cNvPr>
-            <p:cNvCxnSpPr>
-              <a:cxnSpLocks/>
-            </p:cNvCxnSpPr>
-            <p:nvPr/>
-          </p:nvCxnSpPr>
-          <p:spPr>
-            <a:xfrm>
-              <a:off x="7890034" y="3040380"/>
-              <a:ext cx="1749266" cy="965924"/>
-            </a:xfrm>
-            <a:prstGeom prst="bentConnector3">
-              <a:avLst>
-                <a:gd name="adj1" fmla="val 59257"/>
-              </a:avLst>
-            </a:prstGeom>
-            <a:ln>
-              <a:tailEnd type="triangle"/>
-            </a:ln>
-          </p:spPr>
-          <p:style>
-            <a:lnRef idx="1">
-              <a:schemeClr val="accent1"/>
-            </a:lnRef>
-            <a:fillRef idx="0">
-              <a:schemeClr val="accent1"/>
-            </a:fillRef>
-            <a:effectRef idx="0">
-              <a:schemeClr val="accent1"/>
-            </a:effectRef>
-            <a:fontRef idx="minor">
-              <a:schemeClr val="tx1"/>
-            </a:fontRef>
-          </p:style>
-        </p:cxnSp>
-        <p:sp>
-          <p:nvSpPr>
-            <p:cNvPr id="16" name="TextBox 15">
-              <a:extLst>
-                <a:ext uri="{FF2B5EF4-FFF2-40B4-BE49-F238E27FC236}">
-                  <a16:creationId xmlns:a16="http://schemas.microsoft.com/office/drawing/2014/main" id="{6EFFC9A5-A5AA-4B6C-A81F-7B45A3B64CC4}"/>
-                </a:ext>
-              </a:extLst>
-            </p:cNvPr>
-            <p:cNvSpPr txBox="1"/>
-            <p:nvPr/>
-          </p:nvSpPr>
-          <p:spPr>
-            <a:xfrm>
-              <a:off x="7923386" y="2809786"/>
-              <a:ext cx="1015021" cy="600164"/>
-            </a:xfrm>
-            <a:prstGeom prst="rect">
-              <a:avLst/>
-            </a:prstGeom>
-            <a:noFill/>
-          </p:spPr>
-          <p:txBody>
-            <a:bodyPr wrap="none" rtlCol="0">
-              <a:spAutoFit/>
-            </a:bodyPr>
-            <a:lstStyle/>
-            <a:p>
-              <a:r>
-                <a:rPr lang="en-US" sz="1200" b="1" dirty="0"/>
-                <a:t>SMS / Email</a:t>
-              </a:r>
-              <a:endParaRPr lang="en-US" sz="1200" dirty="0"/>
-            </a:p>
-            <a:p>
-              <a:r>
-                <a:rPr lang="en-US" sz="1050" dirty="0"/>
-                <a:t>Send messages</a:t>
-              </a:r>
-            </a:p>
-            <a:p>
-              <a:r>
-                <a:rPr lang="en-US" sz="1050" dirty="0"/>
-                <a:t>to guest device</a:t>
-              </a:r>
-            </a:p>
-          </p:txBody>
-        </p:sp>
-      </p:grpSp>
-      <p:sp>
-        <p:nvSpPr>
-          <p:cNvPr id="2" name="Rectangle 1">
-            <a:extLst>
-              <a:ext uri="{FF2B5EF4-FFF2-40B4-BE49-F238E27FC236}">
-                <a16:creationId xmlns:a16="http://schemas.microsoft.com/office/drawing/2014/main" id="{5BC64912-2009-4BDE-80C0-4ADD12D6BE5C}"/>
-              </a:ext>
-            </a:extLst>
-          </p:cNvPr>
-          <p:cNvSpPr/>
-          <p:nvPr/>
-        </p:nvSpPr>
-        <p:spPr>
-          <a:xfrm>
-            <a:off x="3968912" y="3350172"/>
-            <a:ext cx="681915" cy="964654"/>
-          </a:xfrm>
-          <a:prstGeom prst="rect">
-            <a:avLst/>
-          </a:prstGeom>
-          <a:solidFill>
-            <a:schemeClr val="bg1"/>
-          </a:solidFill>
-          <a:ln>
-            <a:solidFill>
-              <a:schemeClr val="bg1"/>
-            </a:solidFill>
-          </a:ln>
-        </p:spPr>
-        <p:style>
-          <a:lnRef idx="2">
-            <a:schemeClr val="accent1">
-              <a:shade val="50000"/>
-            </a:schemeClr>
-          </a:lnRef>
-          <a:fillRef idx="1">
-            <a:schemeClr val="accent1"/>
-          </a:fillRef>
-          <a:effectRef idx="0">
-            <a:schemeClr val="accent1"/>
-          </a:effectRef>
-          <a:fontRef idx="minor">
-            <a:schemeClr val="lt1"/>
-          </a:fontRef>
-        </p:style>
-        <p:txBody>
-          <a:bodyPr rtlCol="0" anchor="ctr"/>
-          <a:lstStyle/>
-          <a:p>
-            <a:pPr algn="ctr"/>
-            <a:endParaRPr lang="en-US"/>
-          </a:p>
-        </p:txBody>
-      </p:sp>
-      <p:pic>
-        <p:nvPicPr>
-          <p:cNvPr id="5" name="Picture 4" descr="A close up of a sign&#10;&#10;Description generated with high confidence">
-            <a:extLst>
-              <a:ext uri="{FF2B5EF4-FFF2-40B4-BE49-F238E27FC236}">
-                <a16:creationId xmlns:a16="http://schemas.microsoft.com/office/drawing/2014/main" id="{952F2BBA-D27E-4429-970D-751AF31DA617}"/>
-              </a:ext>
-            </a:extLst>
-          </p:cNvPr>
-          <p:cNvPicPr>
-            <a:picLocks noChangeAspect="1"/>
-          </p:cNvPicPr>
-          <p:nvPr/>
-        </p:nvPicPr>
-        <p:blipFill>
-          <a:blip r:embed="rId5">
-            <a:extLst>
-              <a:ext uri="{28A0092B-C50C-407E-A947-70E740481C1C}">
-                <a14:useLocalDpi xmlns:a14="http://schemas.microsoft.com/office/drawing/2010/main" val="0"/>
-              </a:ext>
-            </a:extLst>
-          </a:blip>
-          <a:stretch>
-            <a:fillRect/>
-          </a:stretch>
-        </p:blipFill>
-        <p:spPr>
-          <a:xfrm>
-            <a:off x="3929277" y="3350172"/>
-            <a:ext cx="780290" cy="780290"/>
-          </a:xfrm>
-          <a:prstGeom prst="rect">
-            <a:avLst/>
-          </a:prstGeom>
-        </p:spPr>
-      </p:pic>
-      <p:sp>
-        <p:nvSpPr>
-          <p:cNvPr id="13" name="TextBox 12">
-            <a:extLst>
-              <a:ext uri="{FF2B5EF4-FFF2-40B4-BE49-F238E27FC236}">
-                <a16:creationId xmlns:a16="http://schemas.microsoft.com/office/drawing/2014/main" id="{D2AD26EE-F1DD-4ADA-8A47-159856D8CAB9}"/>
-              </a:ext>
-            </a:extLst>
-          </p:cNvPr>
-          <p:cNvSpPr txBox="1"/>
-          <p:nvPr/>
-        </p:nvSpPr>
-        <p:spPr>
-          <a:xfrm>
-            <a:off x="3929277" y="4063454"/>
-            <a:ext cx="1206484" cy="276999"/>
-          </a:xfrm>
-          <a:prstGeom prst="rect">
-            <a:avLst/>
-          </a:prstGeom>
-          <a:noFill/>
-        </p:spPr>
-        <p:txBody>
-          <a:bodyPr wrap="none" rtlCol="0">
-            <a:spAutoFit/>
-          </a:bodyPr>
-          <a:lstStyle/>
-          <a:p>
-            <a:r>
-              <a:rPr lang="en-US" sz="1200" b="1" dirty="0"/>
-              <a:t>Azure Functions</a:t>
-            </a:r>
-            <a:endParaRPr lang="en-US" sz="1050" dirty="0"/>
-          </a:p>
-        </p:txBody>
-      </p:sp>
-      <p:grpSp>
-        <p:nvGrpSpPr>
-          <p:cNvPr id="11" name="Group 10">
-            <a:extLst>
-              <a:ext uri="{FF2B5EF4-FFF2-40B4-BE49-F238E27FC236}">
-                <a16:creationId xmlns:a16="http://schemas.microsoft.com/office/drawing/2014/main" id="{3A0275E6-C66A-4BB4-9377-30663BBCEBC9}"/>
-              </a:ext>
-            </a:extLst>
-          </p:cNvPr>
-          <p:cNvGrpSpPr/>
-          <p:nvPr/>
-        </p:nvGrpSpPr>
-        <p:grpSpPr>
-          <a:xfrm>
-            <a:off x="8224294" y="5285730"/>
-            <a:ext cx="1080745" cy="1067445"/>
-            <a:chOff x="8224294" y="5188613"/>
-            <a:chExt cx="1080745" cy="1067445"/>
-          </a:xfrm>
-        </p:grpSpPr>
-        <p:pic>
-          <p:nvPicPr>
-            <p:cNvPr id="10" name="Picture 9" descr="A close up of a sign&#10;&#10;Description generated with very high confidence">
-              <a:extLst>
-                <a:ext uri="{FF2B5EF4-FFF2-40B4-BE49-F238E27FC236}">
-                  <a16:creationId xmlns:a16="http://schemas.microsoft.com/office/drawing/2014/main" id="{68AD2A7F-8B79-472E-AEB9-35D8DE3E05F7}"/>
-                </a:ext>
-              </a:extLst>
-            </p:cNvPr>
-            <p:cNvPicPr>
-              <a:picLocks noChangeAspect="1"/>
-            </p:cNvPicPr>
-            <p:nvPr/>
-          </p:nvPicPr>
-          <p:blipFill>
-            <a:blip r:embed="rId6">
-              <a:extLst>
-                <a:ext uri="{28A0092B-C50C-407E-A947-70E740481C1C}">
-                  <a14:useLocalDpi xmlns:a14="http://schemas.microsoft.com/office/drawing/2010/main" val="0"/>
-                </a:ext>
-              </a:extLst>
-            </a:blip>
-            <a:stretch>
-              <a:fillRect/>
-            </a:stretch>
-          </p:blipFill>
-          <p:spPr>
-            <a:xfrm>
-              <a:off x="8409641" y="5188613"/>
-              <a:ext cx="628863" cy="628863"/>
-            </a:xfrm>
-            <a:prstGeom prst="rect">
-              <a:avLst/>
-            </a:prstGeom>
-          </p:spPr>
-        </p:pic>
-        <p:sp>
-          <p:nvSpPr>
-            <p:cNvPr id="17" name="TextBox 16">
-              <a:extLst>
-                <a:ext uri="{FF2B5EF4-FFF2-40B4-BE49-F238E27FC236}">
-                  <a16:creationId xmlns:a16="http://schemas.microsoft.com/office/drawing/2014/main" id="{51204E36-D1DC-4F26-B2E1-614E236F480A}"/>
-                </a:ext>
-              </a:extLst>
-            </p:cNvPr>
-            <p:cNvSpPr txBox="1"/>
-            <p:nvPr/>
-          </p:nvSpPr>
-          <p:spPr>
-            <a:xfrm>
-              <a:off x="8224294" y="5817476"/>
-              <a:ext cx="1080745" cy="438582"/>
-            </a:xfrm>
-            <a:prstGeom prst="rect">
-              <a:avLst/>
-            </a:prstGeom>
-            <a:noFill/>
-          </p:spPr>
-          <p:txBody>
-            <a:bodyPr wrap="none" rtlCol="0">
-              <a:spAutoFit/>
-            </a:bodyPr>
-            <a:lstStyle/>
-            <a:p>
-              <a:r>
-                <a:rPr lang="en-US" sz="1200" b="1" dirty="0"/>
-                <a:t>Bot Services</a:t>
-              </a:r>
-              <a:endParaRPr lang="en-US" sz="1200" dirty="0"/>
-            </a:p>
-            <a:p>
-              <a:r>
-                <a:rPr lang="en-US" sz="1050" dirty="0"/>
-                <a:t>Trained for Q&amp;A</a:t>
-              </a:r>
-            </a:p>
-          </p:txBody>
-        </p:sp>
-      </p:grpSp>
-      <p:cxnSp>
-        <p:nvCxnSpPr>
-          <p:cNvPr id="15" name="Straight Connector 14">
-            <a:extLst>
-              <a:ext uri="{FF2B5EF4-FFF2-40B4-BE49-F238E27FC236}">
-                <a16:creationId xmlns:a16="http://schemas.microsoft.com/office/drawing/2014/main" id="{87AA0B25-62B6-4E23-9AD0-E8FBE60D4E84}"/>
-              </a:ext>
-            </a:extLst>
-          </p:cNvPr>
-          <p:cNvCxnSpPr>
-            <a:stCxn id="10" idx="0"/>
-          </p:cNvCxnSpPr>
-          <p:nvPr/>
-        </p:nvCxnSpPr>
-        <p:spPr>
-          <a:xfrm flipH="1" flipV="1">
-            <a:off x="8724072" y="5052848"/>
-            <a:ext cx="1" cy="232882"/>
-          </a:xfrm>
-          <a:prstGeom prst="line">
-            <a:avLst/>
-          </a:prstGeom>
-          <a:ln>
-            <a:prstDash val="sysDot"/>
-          </a:ln>
-        </p:spPr>
-        <p:style>
-          <a:lnRef idx="3">
-            <a:schemeClr val="accent6"/>
-          </a:lnRef>
-          <a:fillRef idx="0">
-            <a:schemeClr val="accent6"/>
-          </a:fillRef>
-          <a:effectRef idx="2">
-            <a:schemeClr val="accent6"/>
-          </a:effectRef>
-          <a:fontRef idx="minor">
-            <a:schemeClr val="tx1"/>
-          </a:fontRef>
-        </p:style>
-      </p:cxnSp>
     </p:spTree>
     <p:extLst>
       <p:ext uri="{BB962C8B-B14F-4D97-AF65-F5344CB8AC3E}">

</xml_diff>